<commit_message>
updated doc, changed colors
</commit_message>
<xml_diff>
--- a/docs/images/ColoniesArch.pptx
+++ b/docs/images/ColoniesArch.pptx
@@ -683,7 +683,7 @@
           <a:p>
             <a:fld id="{B79BB705-F904-8E46-BC0B-BBFDED0D0282}" type="datetimeFigureOut">
               <a:rPr lang="en-US" smtClean="0"/>
-              <a:t>4/3/22</a:t>
+              <a:t>4/5/22</a:t>
             </a:fld>
             <a:endParaRPr lang="en-US"/>
           </a:p>
@@ -853,7 +853,7 @@
           <a:p>
             <a:fld id="{B79BB705-F904-8E46-BC0B-BBFDED0D0282}" type="datetimeFigureOut">
               <a:rPr lang="en-US" smtClean="0"/>
-              <a:t>4/3/22</a:t>
+              <a:t>4/5/22</a:t>
             </a:fld>
             <a:endParaRPr lang="en-US"/>
           </a:p>
@@ -1033,7 +1033,7 @@
           <a:p>
             <a:fld id="{B79BB705-F904-8E46-BC0B-BBFDED0D0282}" type="datetimeFigureOut">
               <a:rPr lang="en-US" smtClean="0"/>
-              <a:t>4/3/22</a:t>
+              <a:t>4/5/22</a:t>
             </a:fld>
             <a:endParaRPr lang="en-US"/>
           </a:p>
@@ -1203,7 +1203,7 @@
           <a:p>
             <a:fld id="{B79BB705-F904-8E46-BC0B-BBFDED0D0282}" type="datetimeFigureOut">
               <a:rPr lang="en-US" smtClean="0"/>
-              <a:t>4/3/22</a:t>
+              <a:t>4/5/22</a:t>
             </a:fld>
             <a:endParaRPr lang="en-US"/>
           </a:p>
@@ -1447,7 +1447,7 @@
           <a:p>
             <a:fld id="{B79BB705-F904-8E46-BC0B-BBFDED0D0282}" type="datetimeFigureOut">
               <a:rPr lang="en-US" smtClean="0"/>
-              <a:t>4/3/22</a:t>
+              <a:t>4/5/22</a:t>
             </a:fld>
             <a:endParaRPr lang="en-US"/>
           </a:p>
@@ -1679,7 +1679,7 @@
           <a:p>
             <a:fld id="{B79BB705-F904-8E46-BC0B-BBFDED0D0282}" type="datetimeFigureOut">
               <a:rPr lang="en-US" smtClean="0"/>
-              <a:t>4/3/22</a:t>
+              <a:t>4/5/22</a:t>
             </a:fld>
             <a:endParaRPr lang="en-US"/>
           </a:p>
@@ -2046,7 +2046,7 @@
           <a:p>
             <a:fld id="{B79BB705-F904-8E46-BC0B-BBFDED0D0282}" type="datetimeFigureOut">
               <a:rPr lang="en-US" smtClean="0"/>
-              <a:t>4/3/22</a:t>
+              <a:t>4/5/22</a:t>
             </a:fld>
             <a:endParaRPr lang="en-US"/>
           </a:p>
@@ -2164,7 +2164,7 @@
           <a:p>
             <a:fld id="{B79BB705-F904-8E46-BC0B-BBFDED0D0282}" type="datetimeFigureOut">
               <a:rPr lang="en-US" smtClean="0"/>
-              <a:t>4/3/22</a:t>
+              <a:t>4/5/22</a:t>
             </a:fld>
             <a:endParaRPr lang="en-US"/>
           </a:p>
@@ -2259,7 +2259,7 @@
           <a:p>
             <a:fld id="{B79BB705-F904-8E46-BC0B-BBFDED0D0282}" type="datetimeFigureOut">
               <a:rPr lang="en-US" smtClean="0"/>
-              <a:t>4/3/22</a:t>
+              <a:t>4/5/22</a:t>
             </a:fld>
             <a:endParaRPr lang="en-US"/>
           </a:p>
@@ -2536,7 +2536,7 @@
           <a:p>
             <a:fld id="{B79BB705-F904-8E46-BC0B-BBFDED0D0282}" type="datetimeFigureOut">
               <a:rPr lang="en-US" smtClean="0"/>
-              <a:t>4/3/22</a:t>
+              <a:t>4/5/22</a:t>
             </a:fld>
             <a:endParaRPr lang="en-US"/>
           </a:p>
@@ -2793,7 +2793,7 @@
           <a:p>
             <a:fld id="{B79BB705-F904-8E46-BC0B-BBFDED0D0282}" type="datetimeFigureOut">
               <a:rPr lang="en-US" smtClean="0"/>
-              <a:t>4/3/22</a:t>
+              <a:t>4/5/22</a:t>
             </a:fld>
             <a:endParaRPr lang="en-US"/>
           </a:p>
@@ -3006,7 +3006,7 @@
           <a:p>
             <a:fld id="{B79BB705-F904-8E46-BC0B-BBFDED0D0282}" type="datetimeFigureOut">
               <a:rPr lang="en-US" smtClean="0"/>
-              <a:t>4/3/22</a:t>
+              <a:t>4/5/22</a:t>
             </a:fld>
             <a:endParaRPr lang="en-US"/>
           </a:p>
@@ -4361,7 +4361,7 @@
             <a:avLst/>
           </a:prstGeom>
           <a:solidFill>
-            <a:srgbClr val="C9146F"/>
+            <a:srgbClr val="B58900"/>
           </a:solidFill>
           <a:ln>
             <a:noFill/>
@@ -4781,7 +4781,7 @@
             <a:avLst/>
           </a:prstGeom>
           <a:solidFill>
-            <a:srgbClr val="C9146F"/>
+            <a:srgbClr val="B58900"/>
           </a:solidFill>
           <a:ln>
             <a:noFill/>
@@ -5112,7 +5112,7 @@
             <a:avLst/>
           </a:prstGeom>
           <a:solidFill>
-            <a:srgbClr val="C9146F"/>
+            <a:srgbClr val="B58900"/>
           </a:solidFill>
           <a:ln>
             <a:noFill/>
@@ -7467,7 +7467,7 @@
             <a:avLst/>
           </a:prstGeom>
           <a:solidFill>
-            <a:srgbClr val="C9146F"/>
+            <a:srgbClr val="B58900"/>
           </a:solidFill>
           <a:ln>
             <a:noFill/>
@@ -7863,7 +7863,7 @@
             <a:avLst/>
           </a:prstGeom>
           <a:solidFill>
-            <a:srgbClr val="C9146F"/>
+            <a:srgbClr val="B58900"/>
           </a:solidFill>
           <a:ln>
             <a:noFill/>
@@ -8238,7 +8238,7 @@
             <a:avLst/>
           </a:prstGeom>
           <a:solidFill>
-            <a:srgbClr val="C9146F"/>
+            <a:srgbClr val="B58900"/>
           </a:solidFill>
           <a:ln>
             <a:noFill/>

</xml_diff>